<commit_message>
Update to contain new resume and coursework
</commit_message>
<xml_diff>
--- a/Documents/Images.pptx
+++ b/Documents/Images.pptx
@@ -3496,7 +3496,7 @@
       </p:grpSpPr>
       <p:pic>
         <p:nvPicPr>
-          <p:cNvPr id="4" name="Picture 72" descr="mage result for blue green waves ribbon abstract"/>
+          <p:cNvPr id="8" name="Picture 54" descr="mage result for blue green waves ribbon abstract"/>
           <p:cNvPicPr>
             <a:picLocks noChangeAspect="1" noChangeArrowheads="1"/>
           </p:cNvPicPr>
@@ -3504,47 +3504,6 @@
         </p:nvPicPr>
         <p:blipFill>
           <a:blip r:embed="rId2">
-            <a:extLst>
-              <a:ext uri="{28A0092B-C50C-407E-A947-70E740481C1C}">
-                <a14:useLocalDpi xmlns:a14="http://schemas.microsoft.com/office/drawing/2010/main" val="0"/>
-              </a:ext>
-            </a:extLst>
-          </a:blip>
-          <a:srcRect/>
-          <a:stretch>
-            <a:fillRect/>
-          </a:stretch>
-        </p:blipFill>
-        <p:spPr bwMode="auto">
-          <a:xfrm>
-            <a:off x="479015" y="853927"/>
-            <a:ext cx="8401050" cy="2600325"/>
-          </a:xfrm>
-          <a:prstGeom prst="rect">
-            <a:avLst/>
-          </a:prstGeom>
-          <a:noFill/>
-          <a:extLst>
-            <a:ext uri="{909E8E84-426E-40DD-AFC4-6F175D3DCCD1}">
-              <a14:hiddenFill xmlns:a14="http://schemas.microsoft.com/office/drawing/2010/main">
-                <a:solidFill>
-                  <a:srgbClr val="FFFFFF"/>
-                </a:solidFill>
-              </a14:hiddenFill>
-            </a:ext>
-          </a:extLst>
-        </p:spPr>
-      </p:pic>
-      <p:pic>
-        <p:nvPicPr>
-          <p:cNvPr id="8" name="Picture 54" descr="mage result for blue green waves ribbon abstract"/>
-          <p:cNvPicPr>
-            <a:picLocks noChangeAspect="1" noChangeArrowheads="1"/>
-          </p:cNvPicPr>
-          <p:nvPr/>
-        </p:nvPicPr>
-        <p:blipFill>
-          <a:blip r:embed="rId3">
             <a:extLst>
               <a:ext uri="{28A0092B-C50C-407E-A947-70E740481C1C}">
                 <a14:useLocalDpi xmlns:a14="http://schemas.microsoft.com/office/drawing/2010/main" val="0"/>
@@ -3585,7 +3544,7 @@
           <p:nvPr/>
         </p:nvPicPr>
         <p:blipFill>
-          <a:blip r:embed="rId4">
+          <a:blip r:embed="rId3">
             <a:extLst>
               <a:ext uri="{28A0092B-C50C-407E-A947-70E740481C1C}">
                 <a14:useLocalDpi xmlns:a14="http://schemas.microsoft.com/office/drawing/2010/main" val="0"/>
@@ -3626,7 +3585,7 @@
           <p:nvPr/>
         </p:nvPicPr>
         <p:blipFill rotWithShape="1">
-          <a:blip r:embed="rId5">
+          <a:blip r:embed="rId4">
             <a:extLst>
               <a:ext uri="{28A0092B-C50C-407E-A947-70E740481C1C}">
                 <a14:useLocalDpi xmlns:a14="http://schemas.microsoft.com/office/drawing/2010/main" val="0"/>
@@ -3658,14 +3617,14 @@
       </p:pic>
       <p:pic>
         <p:nvPicPr>
-          <p:cNvPr id="11" name="Picture 18" descr="elated image"/>
+          <p:cNvPr id="7" name="Picture 72" descr="mage result for blue green waves ribbon abstract"/>
           <p:cNvPicPr>
             <a:picLocks noChangeAspect="1" noChangeArrowheads="1"/>
           </p:cNvPicPr>
           <p:nvPr/>
         </p:nvPicPr>
         <p:blipFill>
-          <a:blip r:embed="rId6">
+          <a:blip r:embed="rId5">
             <a:extLst>
               <a:ext uri="{28A0092B-C50C-407E-A947-70E740481C1C}">
                 <a14:useLocalDpi xmlns:a14="http://schemas.microsoft.com/office/drawing/2010/main" val="0"/>
@@ -3678,9 +3637,9 @@
           </a:stretch>
         </p:blipFill>
         <p:spPr bwMode="auto">
-          <a:xfrm rot="2358353">
-            <a:off x="815519" y="199668"/>
-            <a:ext cx="1173568" cy="2142531"/>
+          <a:xfrm>
+            <a:off x="379002" y="443970"/>
+            <a:ext cx="8401050" cy="2600325"/>
           </a:xfrm>
           <a:prstGeom prst="rect">
             <a:avLst/>
@@ -3727,6 +3686,475 @@
           <a:chExt cx="0" cy="0"/>
         </a:xfrm>
       </p:grpSpPr>
+      <p:grpSp>
+        <p:nvGrpSpPr>
+          <p:cNvPr id="10" name="Group 9"/>
+          <p:cNvGrpSpPr/>
+          <p:nvPr/>
+        </p:nvGrpSpPr>
+        <p:grpSpPr>
+          <a:xfrm>
+            <a:off x="3280980" y="1557842"/>
+            <a:ext cx="996849" cy="1579820"/>
+            <a:chOff x="2345033" y="2370435"/>
+            <a:chExt cx="996849" cy="1579820"/>
+          </a:xfrm>
+        </p:grpSpPr>
+        <p:sp>
+          <p:nvSpPr>
+            <p:cNvPr id="6" name="Rectangle 5"/>
+            <p:cNvSpPr/>
+            <p:nvPr/>
+          </p:nvSpPr>
+          <p:spPr>
+            <a:xfrm>
+              <a:off x="2345033" y="2370435"/>
+              <a:ext cx="989373" cy="1569660"/>
+            </a:xfrm>
+            <a:prstGeom prst="rect">
+              <a:avLst/>
+            </a:prstGeom>
+            <a:noFill/>
+          </p:spPr>
+          <p:txBody>
+            <a:bodyPr wrap="none" lIns="91440" tIns="45720" rIns="91440" bIns="45720">
+              <a:spAutoFit/>
+            </a:bodyPr>
+            <a:lstStyle/>
+            <a:p>
+              <a:pPr algn="ctr"/>
+              <a:r>
+                <a:rPr lang="en-US" sz="9600" i="1" dirty="0" smtClean="0">
+                  <a:ln w="0"/>
+                  <a:solidFill>
+                    <a:srgbClr val="00B0F0"/>
+                  </a:solidFill>
+                  <a:effectLst>
+                    <a:reflection blurRad="6350" stA="53000" endA="300" endPos="35500" dir="5400000" sy="-90000" algn="bl" rotWithShape="0"/>
+                  </a:effectLst>
+                  <a:latin typeface="Curlz MT" charset="0"/>
+                  <a:ea typeface="Curlz MT" charset="0"/>
+                  <a:cs typeface="Curlz MT" charset="0"/>
+                </a:rPr>
+                <a:t>D</a:t>
+              </a:r>
+              <a:endParaRPr lang="en-US" sz="9600" i="1" dirty="0">
+                <a:ln w="0"/>
+                <a:solidFill>
+                  <a:srgbClr val="00B0F0"/>
+                </a:solidFill>
+                <a:effectLst>
+                  <a:reflection blurRad="6350" stA="53000" endA="300" endPos="35500" dir="5400000" sy="-90000" algn="bl" rotWithShape="0"/>
+                </a:effectLst>
+                <a:latin typeface="Curlz MT" charset="0"/>
+                <a:ea typeface="Curlz MT" charset="0"/>
+                <a:cs typeface="Curlz MT" charset="0"/>
+              </a:endParaRPr>
+            </a:p>
+          </p:txBody>
+        </p:sp>
+        <p:sp>
+          <p:nvSpPr>
+            <p:cNvPr id="4" name="Rectangle 3"/>
+            <p:cNvSpPr/>
+            <p:nvPr/>
+          </p:nvSpPr>
+          <p:spPr>
+            <a:xfrm>
+              <a:off x="2346097" y="2380595"/>
+              <a:ext cx="995785" cy="1569660"/>
+            </a:xfrm>
+            <a:prstGeom prst="rect">
+              <a:avLst/>
+            </a:prstGeom>
+            <a:noFill/>
+          </p:spPr>
+          <p:txBody>
+            <a:bodyPr wrap="none" lIns="91440" tIns="45720" rIns="91440" bIns="45720">
+              <a:spAutoFit/>
+              <a:scene3d>
+                <a:camera prst="orthographicFront"/>
+                <a:lightRig rig="threePt" dir="t"/>
+              </a:scene3d>
+              <a:sp3d extrusionH="57150">
+                <a:bevelT w="38100" h="38100" prst="convex"/>
+              </a:sp3d>
+            </a:bodyPr>
+            <a:lstStyle/>
+            <a:p>
+              <a:pPr algn="ctr"/>
+              <a:r>
+                <a:rPr lang="en-US" sz="9600" i="1" cap="none" spc="50" dirty="0" smtClean="0">
+                  <a:ln w="0">
+                    <a:solidFill>
+                      <a:srgbClr val="833AA6"/>
+                    </a:solidFill>
+                  </a:ln>
+                  <a:solidFill>
+                    <a:schemeClr val="bg2"/>
+                  </a:solidFill>
+                  <a:effectLst>
+                    <a:innerShdw blurRad="63500" dist="50800" dir="13500000">
+                      <a:srgbClr val="000000">
+                        <a:alpha val="50000"/>
+                      </a:srgbClr>
+                    </a:innerShdw>
+                  </a:effectLst>
+                  <a:latin typeface="Curlz MT" charset="0"/>
+                  <a:ea typeface="Curlz MT" charset="0"/>
+                  <a:cs typeface="Curlz MT" charset="0"/>
+                </a:rPr>
+                <a:t>D</a:t>
+              </a:r>
+              <a:endParaRPr lang="en-US" sz="9600" i="1" cap="none" spc="50" dirty="0">
+                <a:ln w="0">
+                  <a:solidFill>
+                    <a:srgbClr val="833AA6"/>
+                  </a:solidFill>
+                </a:ln>
+                <a:solidFill>
+                  <a:schemeClr val="bg2"/>
+                </a:solidFill>
+                <a:effectLst>
+                  <a:innerShdw blurRad="63500" dist="50800" dir="13500000">
+                    <a:srgbClr val="000000">
+                      <a:alpha val="50000"/>
+                    </a:srgbClr>
+                  </a:innerShdw>
+                </a:effectLst>
+                <a:latin typeface="Curlz MT" charset="0"/>
+                <a:ea typeface="Curlz MT" charset="0"/>
+                <a:cs typeface="Curlz MT" charset="0"/>
+              </a:endParaRPr>
+            </a:p>
+          </p:txBody>
+        </p:sp>
+      </p:grpSp>
+      <p:pic>
+        <p:nvPicPr>
+          <p:cNvPr id="20" name="Picture 18" descr="elated image"/>
+          <p:cNvPicPr>
+            <a:picLocks noChangeAspect="1" noChangeArrowheads="1"/>
+          </p:cNvPicPr>
+          <p:nvPr/>
+        </p:nvPicPr>
+        <p:blipFill>
+          <a:blip r:embed="rId2">
+            <a:extLst>
+              <a:ext uri="{28A0092B-C50C-407E-A947-70E740481C1C}">
+                <a14:useLocalDpi xmlns:a14="http://schemas.microsoft.com/office/drawing/2010/main" val="0"/>
+              </a:ext>
+            </a:extLst>
+          </a:blip>
+          <a:srcRect/>
+          <a:stretch>
+            <a:fillRect/>
+          </a:stretch>
+        </p:blipFill>
+        <p:spPr bwMode="auto">
+          <a:xfrm rot="2997906">
+            <a:off x="4299810" y="1777734"/>
+            <a:ext cx="819844" cy="1496754"/>
+          </a:xfrm>
+          <a:prstGeom prst="rect">
+            <a:avLst/>
+          </a:prstGeom>
+          <a:noFill/>
+          <a:extLst>
+            <a:ext uri="{909E8E84-426E-40DD-AFC4-6F175D3DCCD1}">
+              <a14:hiddenFill xmlns:a14="http://schemas.microsoft.com/office/drawing/2010/main">
+                <a:solidFill>
+                  <a:srgbClr val="FFFFFF"/>
+                </a:solidFill>
+              </a14:hiddenFill>
+            </a:ext>
+          </a:extLst>
+        </p:spPr>
+      </p:pic>
+      <p:grpSp>
+        <p:nvGrpSpPr>
+          <p:cNvPr id="9" name="Group 8"/>
+          <p:cNvGrpSpPr/>
+          <p:nvPr/>
+        </p:nvGrpSpPr>
+        <p:grpSpPr>
+          <a:xfrm>
+            <a:off x="4808149" y="2112076"/>
+            <a:ext cx="792225" cy="1579820"/>
+            <a:chOff x="3355061" y="2151995"/>
+            <a:chExt cx="792225" cy="1579820"/>
+          </a:xfrm>
+        </p:grpSpPr>
+        <p:sp>
+          <p:nvSpPr>
+            <p:cNvPr id="7" name="Rectangle 6"/>
+            <p:cNvSpPr/>
+            <p:nvPr/>
+          </p:nvSpPr>
+          <p:spPr>
+            <a:xfrm>
+              <a:off x="3371111" y="2162155"/>
+              <a:ext cx="776175" cy="1569660"/>
+            </a:xfrm>
+            <a:prstGeom prst="rect">
+              <a:avLst/>
+            </a:prstGeom>
+            <a:noFill/>
+          </p:spPr>
+          <p:txBody>
+            <a:bodyPr wrap="none" lIns="91440" tIns="45720" rIns="91440" bIns="45720">
+              <a:spAutoFit/>
+            </a:bodyPr>
+            <a:lstStyle/>
+            <a:p>
+              <a:pPr algn="ctr"/>
+              <a:r>
+                <a:rPr lang="en-US" sz="9600" i="1" dirty="0" smtClean="0">
+                  <a:ln w="0"/>
+                  <a:solidFill>
+                    <a:srgbClr val="00B0F0"/>
+                  </a:solidFill>
+                  <a:effectLst>
+                    <a:reflection blurRad="6350" stA="53000" endA="300" endPos="35500" dir="5400000" sy="-90000" algn="bl" rotWithShape="0"/>
+                  </a:effectLst>
+                  <a:latin typeface="Curlz MT" charset="0"/>
+                  <a:ea typeface="Curlz MT" charset="0"/>
+                  <a:cs typeface="Curlz MT" charset="0"/>
+                </a:rPr>
+                <a:t>S</a:t>
+              </a:r>
+              <a:endParaRPr lang="en-US" sz="9600" i="1" dirty="0">
+                <a:ln w="0"/>
+                <a:solidFill>
+                  <a:srgbClr val="00B0F0"/>
+                </a:solidFill>
+                <a:effectLst>
+                  <a:reflection blurRad="6350" stA="53000" endA="300" endPos="35500" dir="5400000" sy="-90000" algn="bl" rotWithShape="0"/>
+                </a:effectLst>
+                <a:latin typeface="Curlz MT" charset="0"/>
+                <a:ea typeface="Curlz MT" charset="0"/>
+                <a:cs typeface="Curlz MT" charset="0"/>
+              </a:endParaRPr>
+            </a:p>
+          </p:txBody>
+        </p:sp>
+        <p:sp>
+          <p:nvSpPr>
+            <p:cNvPr id="8" name="Rectangle 7"/>
+            <p:cNvSpPr/>
+            <p:nvPr/>
+          </p:nvSpPr>
+          <p:spPr>
+            <a:xfrm>
+              <a:off x="3355061" y="2151995"/>
+              <a:ext cx="782587" cy="1569660"/>
+            </a:xfrm>
+            <a:prstGeom prst="rect">
+              <a:avLst/>
+            </a:prstGeom>
+            <a:noFill/>
+          </p:spPr>
+          <p:txBody>
+            <a:bodyPr wrap="none" lIns="91440" tIns="45720" rIns="91440" bIns="45720">
+              <a:spAutoFit/>
+              <a:scene3d>
+                <a:camera prst="orthographicFront"/>
+                <a:lightRig rig="threePt" dir="t"/>
+              </a:scene3d>
+              <a:sp3d extrusionH="57150">
+                <a:bevelT w="38100" h="38100" prst="convex"/>
+              </a:sp3d>
+            </a:bodyPr>
+            <a:lstStyle/>
+            <a:p>
+              <a:pPr algn="ctr"/>
+              <a:r>
+                <a:rPr lang="en-US" sz="9600" i="1" cap="none" spc="50" dirty="0" smtClean="0">
+                  <a:ln w="0">
+                    <a:solidFill>
+                      <a:srgbClr val="833AA6"/>
+                    </a:solidFill>
+                  </a:ln>
+                  <a:solidFill>
+                    <a:schemeClr val="bg2"/>
+                  </a:solidFill>
+                  <a:effectLst>
+                    <a:innerShdw blurRad="63500" dist="50800" dir="13500000">
+                      <a:srgbClr val="000000">
+                        <a:alpha val="50000"/>
+                      </a:srgbClr>
+                    </a:innerShdw>
+                  </a:effectLst>
+                  <a:latin typeface="Curlz MT" charset="0"/>
+                  <a:ea typeface="Curlz MT" charset="0"/>
+                  <a:cs typeface="Curlz MT" charset="0"/>
+                </a:rPr>
+                <a:t>S</a:t>
+              </a:r>
+              <a:endParaRPr lang="en-US" sz="9600" i="1" cap="none" spc="50" dirty="0">
+                <a:ln w="0">
+                  <a:solidFill>
+                    <a:srgbClr val="833AA6"/>
+                  </a:solidFill>
+                </a:ln>
+                <a:solidFill>
+                  <a:schemeClr val="bg2"/>
+                </a:solidFill>
+                <a:effectLst>
+                  <a:innerShdw blurRad="63500" dist="50800" dir="13500000">
+                    <a:srgbClr val="000000">
+                      <a:alpha val="50000"/>
+                    </a:srgbClr>
+                  </a:innerShdw>
+                </a:effectLst>
+                <a:latin typeface="Curlz MT" charset="0"/>
+                <a:ea typeface="Curlz MT" charset="0"/>
+                <a:cs typeface="Curlz MT" charset="0"/>
+              </a:endParaRPr>
+            </a:p>
+          </p:txBody>
+        </p:sp>
+      </p:grpSp>
+      <p:sp>
+        <p:nvSpPr>
+          <p:cNvPr id="37" name="TextBox 36"/>
+          <p:cNvSpPr txBox="1"/>
+          <p:nvPr/>
+        </p:nvSpPr>
+        <p:spPr>
+          <a:xfrm>
+            <a:off x="3760682" y="2526112"/>
+            <a:ext cx="678904" cy="307777"/>
+          </a:xfrm>
+          <a:prstGeom prst="rect">
+            <a:avLst/>
+          </a:prstGeom>
+          <a:noFill/>
+        </p:spPr>
+        <p:txBody>
+          <a:bodyPr wrap="none" rtlCol="0">
+            <a:spAutoFit/>
+          </a:bodyPr>
+          <a:lstStyle/>
+          <a:p>
+            <a:r>
+              <a:rPr lang="en-US" sz="1400" i="1" dirty="0" err="1" smtClean="0">
+                <a:ln w="0">
+                  <a:solidFill>
+                    <a:srgbClr val="833AA6"/>
+                  </a:solidFill>
+                </a:ln>
+                <a:solidFill>
+                  <a:srgbClr val="00B0F0"/>
+                </a:solidFill>
+                <a:effectLst>
+                  <a:glow rad="63500">
+                    <a:schemeClr val="accent5">
+                      <a:satMod val="175000"/>
+                      <a:alpha val="40000"/>
+                    </a:schemeClr>
+                  </a:glow>
+                </a:effectLst>
+                <a:latin typeface="Cambria Math" charset="0"/>
+                <a:ea typeface="Cambria Math" charset="0"/>
+                <a:cs typeface="Cambria Math" charset="0"/>
+              </a:rPr>
+              <a:t>ouglas</a:t>
+            </a:r>
+            <a:endParaRPr lang="en-US" sz="1400" i="1" dirty="0">
+              <a:ln w="0">
+                <a:solidFill>
+                  <a:srgbClr val="833AA6"/>
+                </a:solidFill>
+              </a:ln>
+              <a:solidFill>
+                <a:srgbClr val="00B0F0"/>
+              </a:solidFill>
+              <a:effectLst>
+                <a:glow rad="63500">
+                  <a:schemeClr val="accent5">
+                    <a:satMod val="175000"/>
+                    <a:alpha val="40000"/>
+                  </a:schemeClr>
+                </a:glow>
+              </a:effectLst>
+              <a:latin typeface="Cambria Math" charset="0"/>
+              <a:ea typeface="Cambria Math" charset="0"/>
+              <a:cs typeface="Cambria Math" charset="0"/>
+            </a:endParaRPr>
+          </a:p>
+        </p:txBody>
+      </p:sp>
+      <p:sp>
+        <p:nvSpPr>
+          <p:cNvPr id="39" name="TextBox 38"/>
+          <p:cNvSpPr txBox="1"/>
+          <p:nvPr/>
+        </p:nvSpPr>
+        <p:spPr>
+          <a:xfrm>
+            <a:off x="5256103" y="3063350"/>
+            <a:ext cx="784189" cy="307777"/>
+          </a:xfrm>
+          <a:prstGeom prst="rect">
+            <a:avLst/>
+          </a:prstGeom>
+          <a:noFill/>
+        </p:spPr>
+        <p:txBody>
+          <a:bodyPr wrap="none" rtlCol="0">
+            <a:spAutoFit/>
+          </a:bodyPr>
+          <a:lstStyle/>
+          <a:p>
+            <a:r>
+              <a:rPr lang="en-US" sz="1400" i="1" dirty="0" err="1" smtClean="0">
+                <a:ln w="0">
+                  <a:solidFill>
+                    <a:srgbClr val="833AA6"/>
+                  </a:solidFill>
+                </a:ln>
+                <a:solidFill>
+                  <a:srgbClr val="00B0F0"/>
+                </a:solidFill>
+                <a:effectLst>
+                  <a:glow rad="63500">
+                    <a:schemeClr val="accent5">
+                      <a:satMod val="175000"/>
+                      <a:alpha val="40000"/>
+                    </a:schemeClr>
+                  </a:glow>
+                </a:effectLst>
+                <a:latin typeface="Cambria Math" charset="0"/>
+                <a:ea typeface="Cambria Math" charset="0"/>
+                <a:cs typeface="Cambria Math" charset="0"/>
+              </a:rPr>
+              <a:t>herman</a:t>
+            </a:r>
+            <a:endParaRPr lang="en-US" sz="1400" i="1" dirty="0">
+              <a:ln w="0">
+                <a:solidFill>
+                  <a:srgbClr val="833AA6"/>
+                </a:solidFill>
+              </a:ln>
+              <a:solidFill>
+                <a:srgbClr val="00B0F0"/>
+              </a:solidFill>
+              <a:effectLst>
+                <a:glow rad="63500">
+                  <a:schemeClr val="accent5">
+                    <a:satMod val="175000"/>
+                    <a:alpha val="40000"/>
+                  </a:schemeClr>
+                </a:glow>
+              </a:effectLst>
+              <a:latin typeface="Cambria Math" charset="0"/>
+              <a:ea typeface="Cambria Math" charset="0"/>
+              <a:cs typeface="Cambria Math" charset="0"/>
+            </a:endParaRPr>
+          </a:p>
+        </p:txBody>
+      </p:sp>
     </p:spTree>
     <p:extLst>
       <p:ext uri="{BB962C8B-B14F-4D97-AF65-F5344CB8AC3E}">

</xml_diff>